<commit_message>
Update Presentación 23 de Noviembre de 2020.pptx
</commit_message>
<xml_diff>
--- a/Documentos/Presentación 23 de Noviembre de 2020.pptx
+++ b/Documentos/Presentación 23 de Noviembre de 2020.pptx
@@ -209,7 +209,7 @@
           <a:p>
             <a:fld id="{D42B63A8-CA22-F249-8B11-75777F973014}" type="datetimeFigureOut">
               <a:rPr lang="es-ES_tradnl" smtClean="0"/>
-              <a:t>23/11/2020</a:t>
+              <a:t>24/11/2020</a:t>
             </a:fld>
             <a:endParaRPr lang="es-ES_tradnl"/>
           </a:p>
@@ -1916,7 +1916,7 @@
           <a:p>
             <a:fld id="{6C5AE33D-32CE-4125-A2FD-63556E695E13}" type="datetimeFigureOut">
               <a:rPr lang="es-CO" smtClean="0"/>
-              <a:t>23/11/2020</a:t>
+              <a:t>24/11/2020</a:t>
             </a:fld>
             <a:endParaRPr lang="es-CO"/>
           </a:p>
@@ -2541,8 +2541,8 @@
           <a:chExt cx="0" cy="0"/>
         </a:xfrm>
       </p:grpSpPr>
-      <mc:AlternateContent xmlns:mc="http://schemas.openxmlformats.org/markup-compatibility/2006">
-        <mc:Choice xmlns:a14="http://schemas.microsoft.com/office/drawing/2010/main" Requires="a14">
+      <mc:AlternateContent xmlns:mc="http://schemas.openxmlformats.org/markup-compatibility/2006" xmlns:a14="http://schemas.microsoft.com/office/drawing/2010/main">
+        <mc:Choice Requires="a14">
           <p:sp>
             <p:nvSpPr>
               <p:cNvPr id="2" name="Marcador de contenido 1">
@@ -3303,7 +3303,7 @@
             </p:txBody>
           </p:sp>
         </mc:Choice>
-        <mc:Fallback>
+        <mc:Fallback xmlns="">
           <p:sp>
             <p:nvSpPr>
               <p:cNvPr id="2" name="Marcador de contenido 1">
@@ -4746,7 +4746,7 @@
                 </a:solidFill>
                 <a:latin typeface="Century Gothic" panose="020B0502020202020204" pitchFamily="34" charset="0"/>
               </a:rPr>
-              <a:t>Greater CBL rationing </a:t>
+              <a:t>Greater CBL rationing. </a:t>
             </a:r>
           </a:p>
         </p:txBody>
@@ -6334,8 +6334,8 @@
           <a:chExt cx="0" cy="0"/>
         </a:xfrm>
       </p:grpSpPr>
-      <mc:AlternateContent xmlns:mc="http://schemas.openxmlformats.org/markup-compatibility/2006">
-        <mc:Choice xmlns:a14="http://schemas.microsoft.com/office/drawing/2010/main" Requires="a14">
+      <mc:AlternateContent xmlns:mc="http://schemas.openxmlformats.org/markup-compatibility/2006" xmlns:a14="http://schemas.microsoft.com/office/drawing/2010/main">
+        <mc:Choice Requires="a14">
           <p:sp>
             <p:nvSpPr>
               <p:cNvPr id="2" name="Marcador de contenido 1">
@@ -7356,7 +7356,7 @@
             </p:txBody>
           </p:sp>
         </mc:Choice>
-        <mc:Fallback>
+        <mc:Fallback xmlns="">
           <p:sp>
             <p:nvSpPr>
               <p:cNvPr id="2" name="Marcador de contenido 1">
@@ -11435,8 +11435,8 @@
           <a:chExt cx="0" cy="0"/>
         </a:xfrm>
       </p:grpSpPr>
-      <mc:AlternateContent xmlns:mc="http://schemas.openxmlformats.org/markup-compatibility/2006">
-        <mc:Choice xmlns:a14="http://schemas.microsoft.com/office/drawing/2010/main" Requires="a14">
+      <mc:AlternateContent xmlns:mc="http://schemas.openxmlformats.org/markup-compatibility/2006" xmlns:a14="http://schemas.microsoft.com/office/drawing/2010/main">
+        <mc:Choice Requires="a14">
           <p:sp>
             <p:nvSpPr>
               <p:cNvPr id="2" name="Marcador de contenido 1">
@@ -11661,7 +11661,7 @@
             </p:txBody>
           </p:sp>
         </mc:Choice>
-        <mc:Fallback>
+        <mc:Fallback xmlns="">
           <p:sp>
             <p:nvSpPr>
               <p:cNvPr id="2" name="Marcador de contenido 1">
@@ -11773,8 +11773,8 @@
           <a:chExt cx="0" cy="0"/>
         </a:xfrm>
       </p:grpSpPr>
-      <mc:AlternateContent xmlns:mc="http://schemas.openxmlformats.org/markup-compatibility/2006">
-        <mc:Choice xmlns:a14="http://schemas.microsoft.com/office/drawing/2010/main" Requires="a14">
+      <mc:AlternateContent xmlns:mc="http://schemas.openxmlformats.org/markup-compatibility/2006" xmlns:a14="http://schemas.microsoft.com/office/drawing/2010/main">
+        <mc:Choice Requires="a14">
           <p:sp>
             <p:nvSpPr>
               <p:cNvPr id="2" name="Marcador de contenido 1">
@@ -13356,7 +13356,7 @@
             </p:txBody>
           </p:sp>
         </mc:Choice>
-        <mc:Fallback>
+        <mc:Fallback xmlns="">
           <p:sp>
             <p:nvSpPr>
               <p:cNvPr id="2" name="Marcador de contenido 1">

</xml_diff>